<commit_message>
Update Group 13 Level 4 & 5 Presentation.pptx
</commit_message>
<xml_diff>
--- a/Presentations/Group 13 Level 4 & 5 Presentation.pptx
+++ b/Presentations/Group 13 Level 4 & 5 Presentation.pptx
@@ -266,7 +266,7 @@
           <a:p>
             <a:fld id="{90CAAAAF-6875-46FD-B12D-8AF225AFEBE5}" type="datetimeFigureOut">
               <a:rPr lang="en-GB" smtClean="0"/>
-              <a:t>03/03/2019</a:t>
+              <a:t>04/03/2019</a:t>
             </a:fld>
             <a:endParaRPr lang="en-GB"/>
           </a:p>
@@ -466,7 +466,7 @@
           <a:p>
             <a:fld id="{90CAAAAF-6875-46FD-B12D-8AF225AFEBE5}" type="datetimeFigureOut">
               <a:rPr lang="en-GB" smtClean="0"/>
-              <a:t>03/03/2019</a:t>
+              <a:t>04/03/2019</a:t>
             </a:fld>
             <a:endParaRPr lang="en-GB"/>
           </a:p>
@@ -676,7 +676,7 @@
           <a:p>
             <a:fld id="{90CAAAAF-6875-46FD-B12D-8AF225AFEBE5}" type="datetimeFigureOut">
               <a:rPr lang="en-GB" smtClean="0"/>
-              <a:t>03/03/2019</a:t>
+              <a:t>04/03/2019</a:t>
             </a:fld>
             <a:endParaRPr lang="en-GB"/>
           </a:p>
@@ -876,7 +876,7 @@
           <a:p>
             <a:fld id="{90CAAAAF-6875-46FD-B12D-8AF225AFEBE5}" type="datetimeFigureOut">
               <a:rPr lang="en-GB" smtClean="0"/>
-              <a:t>03/03/2019</a:t>
+              <a:t>04/03/2019</a:t>
             </a:fld>
             <a:endParaRPr lang="en-GB"/>
           </a:p>
@@ -1152,7 +1152,7 @@
           <a:p>
             <a:fld id="{90CAAAAF-6875-46FD-B12D-8AF225AFEBE5}" type="datetimeFigureOut">
               <a:rPr lang="en-GB" smtClean="0"/>
-              <a:t>03/03/2019</a:t>
+              <a:t>04/03/2019</a:t>
             </a:fld>
             <a:endParaRPr lang="en-GB"/>
           </a:p>
@@ -1420,7 +1420,7 @@
           <a:p>
             <a:fld id="{90CAAAAF-6875-46FD-B12D-8AF225AFEBE5}" type="datetimeFigureOut">
               <a:rPr lang="en-GB" smtClean="0"/>
-              <a:t>03/03/2019</a:t>
+              <a:t>04/03/2019</a:t>
             </a:fld>
             <a:endParaRPr lang="en-GB"/>
           </a:p>
@@ -1835,7 +1835,7 @@
           <a:p>
             <a:fld id="{90CAAAAF-6875-46FD-B12D-8AF225AFEBE5}" type="datetimeFigureOut">
               <a:rPr lang="en-GB" smtClean="0"/>
-              <a:t>03/03/2019</a:t>
+              <a:t>04/03/2019</a:t>
             </a:fld>
             <a:endParaRPr lang="en-GB"/>
           </a:p>
@@ -1977,7 +1977,7 @@
           <a:p>
             <a:fld id="{90CAAAAF-6875-46FD-B12D-8AF225AFEBE5}" type="datetimeFigureOut">
               <a:rPr lang="en-GB" smtClean="0"/>
-              <a:t>03/03/2019</a:t>
+              <a:t>04/03/2019</a:t>
             </a:fld>
             <a:endParaRPr lang="en-GB"/>
           </a:p>
@@ -2090,7 +2090,7 @@
           <a:p>
             <a:fld id="{90CAAAAF-6875-46FD-B12D-8AF225AFEBE5}" type="datetimeFigureOut">
               <a:rPr lang="en-GB" smtClean="0"/>
-              <a:t>03/03/2019</a:t>
+              <a:t>04/03/2019</a:t>
             </a:fld>
             <a:endParaRPr lang="en-GB"/>
           </a:p>
@@ -2403,7 +2403,7 @@
           <a:p>
             <a:fld id="{90CAAAAF-6875-46FD-B12D-8AF225AFEBE5}" type="datetimeFigureOut">
               <a:rPr lang="en-GB" smtClean="0"/>
-              <a:t>03/03/2019</a:t>
+              <a:t>04/03/2019</a:t>
             </a:fld>
             <a:endParaRPr lang="en-GB"/>
           </a:p>
@@ -2692,7 +2692,7 @@
           <a:p>
             <a:fld id="{90CAAAAF-6875-46FD-B12D-8AF225AFEBE5}" type="datetimeFigureOut">
               <a:rPr lang="en-GB" smtClean="0"/>
-              <a:t>03/03/2019</a:t>
+              <a:t>04/03/2019</a:t>
             </a:fld>
             <a:endParaRPr lang="en-GB"/>
           </a:p>
@@ -2935,7 +2935,7 @@
           <a:p>
             <a:fld id="{90CAAAAF-6875-46FD-B12D-8AF225AFEBE5}" type="datetimeFigureOut">
               <a:rPr lang="en-GB" smtClean="0"/>
-              <a:t>03/03/2019</a:t>
+              <a:t>04/03/2019</a:t>
             </a:fld>
             <a:endParaRPr lang="en-GB"/>
           </a:p>
@@ -5539,7 +5539,7 @@
         </p:nvSpPr>
         <p:spPr>
           <a:xfrm>
-            <a:off x="-642459" y="344236"/>
+            <a:off x="-172423" y="405838"/>
             <a:ext cx="4907557" cy="1325563"/>
           </a:xfrm>
           <a:prstGeom prst="rect">
@@ -6823,7 +6823,7 @@
         </p:nvSpPr>
         <p:spPr>
           <a:xfrm>
-            <a:off x="-642459" y="344236"/>
+            <a:off x="-690805" y="824717"/>
             <a:ext cx="7624373" cy="1325563"/>
           </a:xfrm>
           <a:prstGeom prst="rect">
@@ -6832,7 +6832,7 @@
         </p:spPr>
         <p:txBody>
           <a:bodyPr vert="horz" lIns="91440" tIns="45720" rIns="91440" bIns="45720" rtlCol="0" anchor="b">
-            <a:normAutofit/>
+            <a:normAutofit lnSpcReduction="10000"/>
           </a:bodyPr>
           <a:lstStyle>
             <a:lvl1pPr algn="ctr" defTabSz="914400" rtl="0" eaLnBrk="1" latinLnBrk="0" hangingPunct="1">
@@ -6877,7 +6877,7 @@
         </p:nvSpPr>
         <p:spPr>
           <a:xfrm>
-            <a:off x="579487" y="1844759"/>
+            <a:off x="529557" y="2085189"/>
             <a:ext cx="3663182" cy="1384995"/>
           </a:xfrm>
           <a:prstGeom prst="rect">
@@ -6938,7 +6938,7 @@
         </p:nvSpPr>
         <p:spPr>
           <a:xfrm>
-            <a:off x="605610" y="3320445"/>
+            <a:off x="555680" y="3560875"/>
             <a:ext cx="6939720" cy="1815882"/>
           </a:xfrm>
           <a:prstGeom prst="rect">
@@ -7362,8 +7362,8 @@
         </p:nvSpPr>
         <p:spPr>
           <a:xfrm rot="10800000">
-            <a:off x="9122044" y="3759173"/>
-            <a:ext cx="1241524" cy="300379"/>
+            <a:off x="9122044" y="3759172"/>
+            <a:ext cx="1241524" cy="340302"/>
           </a:xfrm>
           <a:prstGeom prst="rightArrow">
             <a:avLst/>
@@ -8465,7 +8465,7 @@
         </p:nvSpPr>
         <p:spPr>
           <a:xfrm>
-            <a:off x="-412467" y="353354"/>
+            <a:off x="-65334" y="414684"/>
             <a:ext cx="3582277" cy="1325563"/>
           </a:xfrm>
           <a:prstGeom prst="rect">
@@ -9554,7 +9554,7 @@
         </p:nvSpPr>
         <p:spPr>
           <a:xfrm>
-            <a:off x="-412467" y="353354"/>
+            <a:off x="-509456" y="897734"/>
             <a:ext cx="5236137" cy="1325563"/>
           </a:xfrm>
           <a:prstGeom prst="rect">
@@ -9563,7 +9563,7 @@
         </p:spPr>
         <p:txBody>
           <a:bodyPr vert="horz" lIns="91440" tIns="45720" rIns="91440" bIns="45720" rtlCol="0" anchor="b">
-            <a:normAutofit/>
+            <a:normAutofit lnSpcReduction="10000"/>
           </a:bodyPr>
           <a:lstStyle>
             <a:lvl1pPr algn="ctr" defTabSz="914400" rtl="0" eaLnBrk="1" latinLnBrk="0" hangingPunct="1">
@@ -10859,7 +10859,7 @@
         </p:spPr>
         <p:txBody>
           <a:bodyPr vert="horz" lIns="91440" tIns="45720" rIns="91440" bIns="45720" rtlCol="0" anchor="b">
-            <a:normAutofit/>
+            <a:normAutofit fontScale="92500"/>
           </a:bodyPr>
           <a:lstStyle>
             <a:lvl1pPr algn="ctr" defTabSz="914400" rtl="0" eaLnBrk="1" latinLnBrk="0" hangingPunct="1">

</xml_diff>